<commit_message>
push instead of pull
</commit_message>
<xml_diff>
--- a/git-and-github-2019.pptx
+++ b/git-and-github-2019.pptx
@@ -54,21 +54,21 @@
   <p:notesSz cx="6858000" cy="9144000"/>
   <p:embeddedFontLst>
     <p:embeddedFont>
-      <p:font typeface="Calibri" panose="020F0502020204030204" pitchFamily="34" charset="0"/>
+      <p:font typeface="Consolas" panose="020B0609020204030204" pitchFamily="49" charset="0"/>
       <p:regular r:id="rId44"/>
       <p:bold r:id="rId45"/>
       <p:italic r:id="rId46"/>
       <p:boldItalic r:id="rId47"/>
     </p:embeddedFont>
     <p:embeddedFont>
-      <p:font typeface="Helvetica Neue" panose="020B0604020202020204" charset="0"/>
+      <p:font typeface="Calibri" panose="020F0502020204030204" pitchFamily="34" charset="0"/>
       <p:regular r:id="rId48"/>
       <p:bold r:id="rId49"/>
       <p:italic r:id="rId50"/>
       <p:boldItalic r:id="rId51"/>
     </p:embeddedFont>
     <p:embeddedFont>
-      <p:font typeface="Consolas" panose="020B0609020204030204" pitchFamily="49" charset="0"/>
+      <p:font typeface="Helvetica Neue" panose="020B0604020202020204" charset="0"/>
       <p:regular r:id="rId52"/>
       <p:bold r:id="rId53"/>
       <p:italic r:id="rId54"/>
@@ -13389,7 +13389,7 @@
               <a:buNone/>
             </a:pPr>
             <a:r>
-              <a:rPr lang="fr-FR" sz="1400" b="0" i="0" u="none" strike="noStrike" cap="none">
+              <a:rPr lang="fr-FR" sz="1400" b="0" i="0" u="none" strike="noStrike" cap="none" dirty="0">
                 <a:solidFill>
                   <a:schemeClr val="accent1"/>
                 </a:solidFill>
@@ -13398,26 +13398,10 @@
                 <a:cs typeface="Arial"/>
                 <a:sym typeface="Arial"/>
               </a:rPr>
-              <a:t>$ echo "Bad developer joker" &gt;&gt; README.md</a:t>
-            </a:r>
-            <a:endParaRPr/>
-          </a:p>
-          <a:p>
-            <a:pPr marL="0" marR="0" lvl="0" indent="0" algn="l" rtl="0">
-              <a:spcBef>
-                <a:spcPts val="280"/>
-              </a:spcBef>
-              <a:spcAft>
-                <a:spcPts val="0"/>
-              </a:spcAft>
-              <a:buClr>
-                <a:schemeClr val="accent1"/>
-              </a:buClr>
-              <a:buFont typeface="Arial"/>
-              <a:buNone/>
-            </a:pPr>
-            <a:r>
-              <a:rPr lang="fr-FR" sz="1400" b="0" i="0" u="none" strike="noStrike" cap="none">
+              <a:t>$ </a:t>
+            </a:r>
+            <a:r>
+              <a:rPr lang="fr-FR" sz="1400" b="0" i="0" u="none" strike="noStrike" cap="none" dirty="0" err="1">
                 <a:solidFill>
                   <a:schemeClr val="accent1"/>
                 </a:solidFill>
@@ -13426,26 +13410,10 @@
                 <a:cs typeface="Arial"/>
                 <a:sym typeface="Arial"/>
               </a:rPr>
-              <a:t>$ git status</a:t>
-            </a:r>
-            <a:endParaRPr/>
-          </a:p>
-          <a:p>
-            <a:pPr marL="0" marR="0" lvl="0" indent="0" algn="l" rtl="0">
-              <a:spcBef>
-                <a:spcPts val="280"/>
-              </a:spcBef>
-              <a:spcAft>
-                <a:spcPts val="0"/>
-              </a:spcAft>
-              <a:buClr>
-                <a:schemeClr val="accent1"/>
-              </a:buClr>
-              <a:buFont typeface="Arial"/>
-              <a:buNone/>
-            </a:pPr>
-            <a:r>
-              <a:rPr lang="fr-FR" sz="1400" b="0" i="0" u="none" strike="noStrike" cap="none">
+              <a:t>echo</a:t>
+            </a:r>
+            <a:r>
+              <a:rPr lang="fr-FR" sz="1400" b="0" i="0" u="none" strike="noStrike" cap="none" dirty="0">
                 <a:solidFill>
                   <a:schemeClr val="accent1"/>
                 </a:solidFill>
@@ -13454,26 +13422,10 @@
                 <a:cs typeface="Arial"/>
                 <a:sym typeface="Arial"/>
               </a:rPr>
-              <a:t># On branch master</a:t>
-            </a:r>
-            <a:endParaRPr/>
-          </a:p>
-          <a:p>
-            <a:pPr marL="0" marR="0" lvl="0" indent="0" algn="l" rtl="0">
-              <a:spcBef>
-                <a:spcPts val="280"/>
-              </a:spcBef>
-              <a:spcAft>
-                <a:spcPts val="0"/>
-              </a:spcAft>
-              <a:buClr>
-                <a:schemeClr val="accent1"/>
-              </a:buClr>
-              <a:buFont typeface="Arial"/>
-              <a:buNone/>
-            </a:pPr>
-            <a:r>
-              <a:rPr lang="fr-FR" sz="1400" b="0" i="0" u="none" strike="noStrike" cap="none">
+              <a:t> "Bad </a:t>
+            </a:r>
+            <a:r>
+              <a:rPr lang="fr-FR" sz="1400" b="0" i="0" u="none" strike="noStrike" cap="none" dirty="0" err="1">
                 <a:solidFill>
                   <a:schemeClr val="accent1"/>
                 </a:solidFill>
@@ -13482,26 +13434,10 @@
                 <a:cs typeface="Arial"/>
                 <a:sym typeface="Arial"/>
               </a:rPr>
-              <a:t># Changes not staged for commit:</a:t>
-            </a:r>
-            <a:endParaRPr/>
-          </a:p>
-          <a:p>
-            <a:pPr marL="0" marR="0" lvl="0" indent="0" algn="l" rtl="0">
-              <a:spcBef>
-                <a:spcPts val="280"/>
-              </a:spcBef>
-              <a:spcAft>
-                <a:spcPts val="0"/>
-              </a:spcAft>
-              <a:buClr>
-                <a:schemeClr val="accent1"/>
-              </a:buClr>
-              <a:buFont typeface="Arial"/>
-              <a:buNone/>
-            </a:pPr>
-            <a:r>
-              <a:rPr lang="fr-FR" sz="1400" b="0" i="0" u="none" strike="noStrike" cap="none">
+              <a:t>developer</a:t>
+            </a:r>
+            <a:r>
+              <a:rPr lang="fr-FR" sz="1400" b="0" i="0" u="none" strike="noStrike" cap="none" dirty="0">
                 <a:solidFill>
                   <a:schemeClr val="accent1"/>
                 </a:solidFill>
@@ -13510,9 +13446,9 @@
                 <a:cs typeface="Arial"/>
                 <a:sym typeface="Arial"/>
               </a:rPr>
-              <a:t>#   (use "git add &lt;file&gt;..." to update what will be committed)</a:t>
-            </a:r>
-            <a:endParaRPr/>
+              <a:t> joker" &gt;&gt; README.md</a:t>
+            </a:r>
+            <a:endParaRPr dirty="0"/>
           </a:p>
           <a:p>
             <a:pPr marL="0" marR="0" lvl="0" indent="0" algn="l" rtl="0">
@@ -13529,7 +13465,7 @@
               <a:buNone/>
             </a:pPr>
             <a:r>
-              <a:rPr lang="fr-FR" sz="1400" b="0" i="0" u="none" strike="noStrike" cap="none">
+              <a:rPr lang="fr-FR" sz="1400" b="0" i="0" u="none" strike="noStrike" cap="none" dirty="0">
                 <a:solidFill>
                   <a:schemeClr val="accent1"/>
                 </a:solidFill>
@@ -13538,26 +13474,10 @@
                 <a:cs typeface="Arial"/>
                 <a:sym typeface="Arial"/>
               </a:rPr>
-              <a:t>#   (use "git checkout -- &lt;file&gt;..." to discard changes in working directory)</a:t>
-            </a:r>
-            <a:endParaRPr/>
-          </a:p>
-          <a:p>
-            <a:pPr marL="0" marR="0" lvl="0" indent="0" algn="l" rtl="0">
-              <a:spcBef>
-                <a:spcPts val="280"/>
-              </a:spcBef>
-              <a:spcAft>
-                <a:spcPts val="0"/>
-              </a:spcAft>
-              <a:buClr>
-                <a:schemeClr val="accent1"/>
-              </a:buClr>
-              <a:buFont typeface="Arial"/>
-              <a:buNone/>
-            </a:pPr>
-            <a:r>
-              <a:rPr lang="fr-FR" sz="1400" b="0" i="0" u="none" strike="noStrike" cap="none">
+              <a:t>$ git </a:t>
+            </a:r>
+            <a:r>
+              <a:rPr lang="fr-FR" sz="1400" b="0" i="0" u="none" strike="noStrike" cap="none" dirty="0" err="1">
                 <a:solidFill>
                   <a:schemeClr val="accent1"/>
                 </a:solidFill>
@@ -13566,9 +13486,9 @@
                 <a:cs typeface="Arial"/>
                 <a:sym typeface="Arial"/>
               </a:rPr>
-              <a:t>#</a:t>
-            </a:r>
-            <a:endParaRPr/>
+              <a:t>status</a:t>
+            </a:r>
+            <a:endParaRPr dirty="0"/>
           </a:p>
           <a:p>
             <a:pPr marL="0" marR="0" lvl="0" indent="0" algn="l" rtl="0">
@@ -13585,7 +13505,7 @@
               <a:buNone/>
             </a:pPr>
             <a:r>
-              <a:rPr lang="fr-FR" sz="1400" b="0" i="0" u="none" strike="noStrike" cap="none">
+              <a:rPr lang="fr-FR" sz="1400" b="0" i="0" u="none" strike="noStrike" cap="none" dirty="0">
                 <a:solidFill>
                   <a:schemeClr val="accent1"/>
                 </a:solidFill>
@@ -13594,26 +13514,10 @@
                 <a:cs typeface="Arial"/>
                 <a:sym typeface="Arial"/>
               </a:rPr>
-              <a:t>#	modified:   README.md</a:t>
-            </a:r>
-            <a:endParaRPr/>
-          </a:p>
-          <a:p>
-            <a:pPr marL="0" marR="0" lvl="0" indent="0" algn="l" rtl="0">
-              <a:spcBef>
-                <a:spcPts val="280"/>
-              </a:spcBef>
-              <a:spcAft>
-                <a:spcPts val="0"/>
-              </a:spcAft>
-              <a:buClr>
-                <a:schemeClr val="accent1"/>
-              </a:buClr>
-              <a:buFont typeface="Arial"/>
-              <a:buNone/>
-            </a:pPr>
-            <a:r>
-              <a:rPr lang="fr-FR" sz="1400" b="0" i="0" u="none" strike="noStrike" cap="none">
+              <a:t># On </a:t>
+            </a:r>
+            <a:r>
+              <a:rPr lang="fr-FR" sz="1400" b="0" i="0" u="none" strike="noStrike" cap="none" dirty="0" err="1">
                 <a:solidFill>
                   <a:schemeClr val="accent1"/>
                 </a:solidFill>
@@ -13622,26 +13526,10 @@
                 <a:cs typeface="Arial"/>
                 <a:sym typeface="Arial"/>
               </a:rPr>
-              <a:t>#</a:t>
-            </a:r>
-            <a:endParaRPr/>
-          </a:p>
-          <a:p>
-            <a:pPr marL="0" marR="0" lvl="0" indent="0" algn="l" rtl="0">
-              <a:spcBef>
-                <a:spcPts val="280"/>
-              </a:spcBef>
-              <a:spcAft>
-                <a:spcPts val="0"/>
-              </a:spcAft>
-              <a:buClr>
-                <a:schemeClr val="accent1"/>
-              </a:buClr>
-              <a:buFont typeface="Arial"/>
-              <a:buNone/>
-            </a:pPr>
-            <a:r>
-              <a:rPr lang="fr-FR" sz="1400" b="0" i="0" u="none" strike="noStrike" cap="none">
+              <a:t>branch</a:t>
+            </a:r>
+            <a:r>
+              <a:rPr lang="fr-FR" sz="1400" b="0" i="0" u="none" strike="noStrike" cap="none" dirty="0">
                 <a:solidFill>
                   <a:schemeClr val="accent1"/>
                 </a:solidFill>
@@ -13650,9 +13538,9 @@
                 <a:cs typeface="Arial"/>
                 <a:sym typeface="Arial"/>
               </a:rPr>
-              <a:t>no changes added to commit (use "git add" and/or "git commit -a")</a:t>
-            </a:r>
-            <a:endParaRPr/>
+              <a:t> master</a:t>
+            </a:r>
+            <a:endParaRPr dirty="0"/>
           </a:p>
           <a:p>
             <a:pPr marL="0" marR="0" lvl="0" indent="0" algn="l" rtl="0">
@@ -13669,7 +13557,7 @@
               <a:buNone/>
             </a:pPr>
             <a:r>
-              <a:rPr lang="fr-FR" sz="1400" b="0" i="0" u="none" strike="noStrike" cap="none">
+              <a:rPr lang="fr-FR" sz="1400" b="0" i="0" u="none" strike="noStrike" cap="none" dirty="0">
                 <a:solidFill>
                   <a:schemeClr val="accent1"/>
                 </a:solidFill>
@@ -13678,26 +13566,10 @@
                 <a:cs typeface="Arial"/>
                 <a:sym typeface="Arial"/>
               </a:rPr>
-              <a:t>$ git diff</a:t>
-            </a:r>
-            <a:endParaRPr/>
-          </a:p>
-          <a:p>
-            <a:pPr marL="0" marR="0" lvl="0" indent="0" algn="l" rtl="0">
-              <a:spcBef>
-                <a:spcPts val="280"/>
-              </a:spcBef>
-              <a:spcAft>
-                <a:spcPts val="0"/>
-              </a:spcAft>
-              <a:buClr>
-                <a:schemeClr val="accent1"/>
-              </a:buClr>
-              <a:buFont typeface="Arial"/>
-              <a:buNone/>
-            </a:pPr>
-            <a:r>
-              <a:rPr lang="fr-FR" sz="1400" b="0" i="0" u="none" strike="noStrike" cap="none">
+              <a:t># Changes not </a:t>
+            </a:r>
+            <a:r>
+              <a:rPr lang="fr-FR" sz="1400" b="0" i="0" u="none" strike="noStrike" cap="none" dirty="0" err="1">
                 <a:solidFill>
                   <a:schemeClr val="accent1"/>
                 </a:solidFill>
@@ -13706,26 +13578,10 @@
                 <a:cs typeface="Arial"/>
                 <a:sym typeface="Arial"/>
               </a:rPr>
-              <a:t>diff --git a/README.md b/README.md</a:t>
-            </a:r>
-            <a:endParaRPr/>
-          </a:p>
-          <a:p>
-            <a:pPr marL="0" marR="0" lvl="0" indent="0" algn="l" rtl="0">
-              <a:spcBef>
-                <a:spcPts val="280"/>
-              </a:spcBef>
-              <a:spcAft>
-                <a:spcPts val="0"/>
-              </a:spcAft>
-              <a:buClr>
-                <a:schemeClr val="accent1"/>
-              </a:buClr>
-              <a:buFont typeface="Arial"/>
-              <a:buNone/>
-            </a:pPr>
-            <a:r>
-              <a:rPr lang="fr-FR" sz="1400" b="0" i="0" u="none" strike="noStrike" cap="none">
+              <a:t>staged</a:t>
+            </a:r>
+            <a:r>
+              <a:rPr lang="fr-FR" sz="1400" b="0" i="0" u="none" strike="noStrike" cap="none" dirty="0">
                 <a:solidFill>
                   <a:schemeClr val="accent1"/>
                 </a:solidFill>
@@ -13734,9 +13590,9 @@
                 <a:cs typeface="Arial"/>
                 <a:sym typeface="Arial"/>
               </a:rPr>
-              <a:t>index bb69143..91a4a14 100644</a:t>
-            </a:r>
-            <a:endParaRPr/>
+              <a:t> for commit:</a:t>
+            </a:r>
+            <a:endParaRPr dirty="0"/>
           </a:p>
           <a:p>
             <a:pPr marL="0" marR="0" lvl="0" indent="0" algn="l" rtl="0">
@@ -13753,7 +13609,7 @@
               <a:buNone/>
             </a:pPr>
             <a:r>
-              <a:rPr lang="fr-FR" sz="1400" b="0" i="0" u="none" strike="noStrike" cap="none">
+              <a:rPr lang="fr-FR" sz="1400" b="0" i="0" u="none" strike="noStrike" cap="none" dirty="0">
                 <a:solidFill>
                   <a:schemeClr val="accent1"/>
                 </a:solidFill>
@@ -13762,26 +13618,10 @@
                 <a:cs typeface="Arial"/>
                 <a:sym typeface="Arial"/>
               </a:rPr>
-              <a:t>--- a/README.md</a:t>
-            </a:r>
-            <a:endParaRPr/>
-          </a:p>
-          <a:p>
-            <a:pPr marL="0" marR="0" lvl="0" indent="0" algn="l" rtl="0">
-              <a:spcBef>
-                <a:spcPts val="280"/>
-              </a:spcBef>
-              <a:spcAft>
-                <a:spcPts val="0"/>
-              </a:spcAft>
-              <a:buClr>
-                <a:schemeClr val="accent1"/>
-              </a:buClr>
-              <a:buFont typeface="Arial"/>
-              <a:buNone/>
-            </a:pPr>
-            <a:r>
-              <a:rPr lang="fr-FR" sz="1400" b="0" i="0" u="none" strike="noStrike" cap="none">
+              <a:t>#   (use "git </a:t>
+            </a:r>
+            <a:r>
+              <a:rPr lang="fr-FR" sz="1400" b="0" i="0" u="none" strike="noStrike" cap="none" dirty="0" err="1">
                 <a:solidFill>
                   <a:schemeClr val="accent1"/>
                 </a:solidFill>
@@ -13790,26 +13630,10 @@
                 <a:cs typeface="Arial"/>
                 <a:sym typeface="Arial"/>
               </a:rPr>
-              <a:t>+++ b/README.md</a:t>
-            </a:r>
-            <a:endParaRPr/>
-          </a:p>
-          <a:p>
-            <a:pPr marL="0" marR="0" lvl="0" indent="0" algn="l" rtl="0">
-              <a:spcBef>
-                <a:spcPts val="280"/>
-              </a:spcBef>
-              <a:spcAft>
-                <a:spcPts val="0"/>
-              </a:spcAft>
-              <a:buClr>
-                <a:schemeClr val="accent1"/>
-              </a:buClr>
-              <a:buFont typeface="Arial"/>
-              <a:buNone/>
-            </a:pPr>
-            <a:r>
-              <a:rPr lang="fr-FR" sz="1400" b="0" i="0" u="none" strike="noStrike" cap="none">
+              <a:t>add</a:t>
+            </a:r>
+            <a:r>
+              <a:rPr lang="fr-FR" sz="1400" b="0" i="0" u="none" strike="noStrike" cap="none" dirty="0">
                 <a:solidFill>
                   <a:schemeClr val="accent1"/>
                 </a:solidFill>
@@ -13818,26 +13642,10 @@
                 <a:cs typeface="Arial"/>
                 <a:sym typeface="Arial"/>
               </a:rPr>
-              <a:t>@@ -1 +1,2 @@</a:t>
-            </a:r>
-            <a:endParaRPr/>
-          </a:p>
-          <a:p>
-            <a:pPr marL="0" marR="0" lvl="0" indent="0" algn="l" rtl="0">
-              <a:spcBef>
-                <a:spcPts val="280"/>
-              </a:spcBef>
-              <a:spcAft>
-                <a:spcPts val="0"/>
-              </a:spcAft>
-              <a:buClr>
-                <a:schemeClr val="accent1"/>
-              </a:buClr>
-              <a:buFont typeface="Arial"/>
-              <a:buNone/>
-            </a:pPr>
-            <a:r>
-              <a:rPr lang="fr-FR" sz="1400" b="0" i="0" u="none" strike="noStrike" cap="none">
+              <a:t> &lt;file&gt;..." to update </a:t>
+            </a:r>
+            <a:r>
+              <a:rPr lang="fr-FR" sz="1400" b="0" i="0" u="none" strike="noStrike" cap="none" dirty="0" err="1">
                 <a:solidFill>
                   <a:schemeClr val="accent1"/>
                 </a:solidFill>
@@ -13846,26 +13654,10 @@
                 <a:cs typeface="Arial"/>
                 <a:sym typeface="Arial"/>
               </a:rPr>
-              <a:t> This is a README.md file for our git exercise</a:t>
-            </a:r>
-            <a:endParaRPr/>
-          </a:p>
-          <a:p>
-            <a:pPr marL="0" marR="0" lvl="0" indent="0" algn="l" rtl="0">
-              <a:spcBef>
-                <a:spcPts val="280"/>
-              </a:spcBef>
-              <a:spcAft>
-                <a:spcPts val="0"/>
-              </a:spcAft>
-              <a:buClr>
-                <a:schemeClr val="accent1"/>
-              </a:buClr>
-              <a:buFont typeface="Arial"/>
-              <a:buNone/>
-            </a:pPr>
-            <a:r>
-              <a:rPr lang="fr-FR" sz="1400" b="0" i="0" u="none" strike="noStrike" cap="none">
+              <a:t>what</a:t>
+            </a:r>
+            <a:r>
+              <a:rPr lang="fr-FR" sz="1400" b="0" i="0" u="none" strike="noStrike" cap="none" dirty="0">
                 <a:solidFill>
                   <a:schemeClr val="accent1"/>
                 </a:solidFill>
@@ -13874,9 +13666,697 @@
                 <a:cs typeface="Arial"/>
                 <a:sym typeface="Arial"/>
               </a:rPr>
-              <a:t>+Bad developer joker</a:t>
-            </a:r>
-            <a:endParaRPr/>
+              <a:t> </a:t>
+            </a:r>
+            <a:r>
+              <a:rPr lang="fr-FR" sz="1400" b="0" i="0" u="none" strike="noStrike" cap="none" dirty="0" err="1">
+                <a:solidFill>
+                  <a:schemeClr val="accent1"/>
+                </a:solidFill>
+                <a:latin typeface="Arial"/>
+                <a:ea typeface="Arial"/>
+                <a:cs typeface="Arial"/>
+                <a:sym typeface="Arial"/>
+              </a:rPr>
+              <a:t>will</a:t>
+            </a:r>
+            <a:r>
+              <a:rPr lang="fr-FR" sz="1400" b="0" i="0" u="none" strike="noStrike" cap="none" dirty="0">
+                <a:solidFill>
+                  <a:schemeClr val="accent1"/>
+                </a:solidFill>
+                <a:latin typeface="Arial"/>
+                <a:ea typeface="Arial"/>
+                <a:cs typeface="Arial"/>
+                <a:sym typeface="Arial"/>
+              </a:rPr>
+              <a:t> </a:t>
+            </a:r>
+            <a:r>
+              <a:rPr lang="fr-FR" sz="1400" b="0" i="0" u="none" strike="noStrike" cap="none" dirty="0" err="1">
+                <a:solidFill>
+                  <a:schemeClr val="accent1"/>
+                </a:solidFill>
+                <a:latin typeface="Arial"/>
+                <a:ea typeface="Arial"/>
+                <a:cs typeface="Arial"/>
+                <a:sym typeface="Arial"/>
+              </a:rPr>
+              <a:t>be</a:t>
+            </a:r>
+            <a:r>
+              <a:rPr lang="fr-FR" sz="1400" b="0" i="0" u="none" strike="noStrike" cap="none" dirty="0">
+                <a:solidFill>
+                  <a:schemeClr val="accent1"/>
+                </a:solidFill>
+                <a:latin typeface="Arial"/>
+                <a:ea typeface="Arial"/>
+                <a:cs typeface="Arial"/>
+                <a:sym typeface="Arial"/>
+              </a:rPr>
+              <a:t> </a:t>
+            </a:r>
+            <a:r>
+              <a:rPr lang="fr-FR" sz="1400" b="0" i="0" u="none" strike="noStrike" cap="none" dirty="0" err="1">
+                <a:solidFill>
+                  <a:schemeClr val="accent1"/>
+                </a:solidFill>
+                <a:latin typeface="Arial"/>
+                <a:ea typeface="Arial"/>
+                <a:cs typeface="Arial"/>
+                <a:sym typeface="Arial"/>
+              </a:rPr>
+              <a:t>committed</a:t>
+            </a:r>
+            <a:r>
+              <a:rPr lang="fr-FR" sz="1400" b="0" i="0" u="none" strike="noStrike" cap="none" dirty="0">
+                <a:solidFill>
+                  <a:schemeClr val="accent1"/>
+                </a:solidFill>
+                <a:latin typeface="Arial"/>
+                <a:ea typeface="Arial"/>
+                <a:cs typeface="Arial"/>
+                <a:sym typeface="Arial"/>
+              </a:rPr>
+              <a:t>)</a:t>
+            </a:r>
+            <a:endParaRPr dirty="0"/>
+          </a:p>
+          <a:p>
+            <a:pPr marL="0" marR="0" lvl="0" indent="0" algn="l" rtl="0">
+              <a:spcBef>
+                <a:spcPts val="280"/>
+              </a:spcBef>
+              <a:spcAft>
+                <a:spcPts val="0"/>
+              </a:spcAft>
+              <a:buClr>
+                <a:schemeClr val="accent1"/>
+              </a:buClr>
+              <a:buFont typeface="Arial"/>
+              <a:buNone/>
+            </a:pPr>
+            <a:r>
+              <a:rPr lang="fr-FR" sz="1400" b="0" i="0" u="none" strike="noStrike" cap="none" dirty="0">
+                <a:solidFill>
+                  <a:schemeClr val="accent1"/>
+                </a:solidFill>
+                <a:latin typeface="Arial"/>
+                <a:ea typeface="Arial"/>
+                <a:cs typeface="Arial"/>
+                <a:sym typeface="Arial"/>
+              </a:rPr>
+              <a:t>#   (use "git </a:t>
+            </a:r>
+            <a:r>
+              <a:rPr lang="fr-FR" sz="1400" b="0" i="0" u="none" strike="noStrike" cap="none" dirty="0" err="1">
+                <a:solidFill>
+                  <a:schemeClr val="accent1"/>
+                </a:solidFill>
+                <a:latin typeface="Arial"/>
+                <a:ea typeface="Arial"/>
+                <a:cs typeface="Arial"/>
+                <a:sym typeface="Arial"/>
+              </a:rPr>
+              <a:t>checkout</a:t>
+            </a:r>
+            <a:r>
+              <a:rPr lang="fr-FR" sz="1400" b="0" i="0" u="none" strike="noStrike" cap="none" dirty="0">
+                <a:solidFill>
+                  <a:schemeClr val="accent1"/>
+                </a:solidFill>
+                <a:latin typeface="Arial"/>
+                <a:ea typeface="Arial"/>
+                <a:cs typeface="Arial"/>
+                <a:sym typeface="Arial"/>
+              </a:rPr>
+              <a:t> -- &lt;file&gt;..." to </a:t>
+            </a:r>
+            <a:r>
+              <a:rPr lang="fr-FR" sz="1400" b="0" i="0" u="none" strike="noStrike" cap="none" dirty="0" err="1">
+                <a:solidFill>
+                  <a:schemeClr val="accent1"/>
+                </a:solidFill>
+                <a:latin typeface="Arial"/>
+                <a:ea typeface="Arial"/>
+                <a:cs typeface="Arial"/>
+                <a:sym typeface="Arial"/>
+              </a:rPr>
+              <a:t>discard</a:t>
+            </a:r>
+            <a:r>
+              <a:rPr lang="fr-FR" sz="1400" b="0" i="0" u="none" strike="noStrike" cap="none" dirty="0">
+                <a:solidFill>
+                  <a:schemeClr val="accent1"/>
+                </a:solidFill>
+                <a:latin typeface="Arial"/>
+                <a:ea typeface="Arial"/>
+                <a:cs typeface="Arial"/>
+                <a:sym typeface="Arial"/>
+              </a:rPr>
+              <a:t> changes in </a:t>
+            </a:r>
+            <a:r>
+              <a:rPr lang="fr-FR" sz="1400" b="0" i="0" u="none" strike="noStrike" cap="none" dirty="0" err="1">
+                <a:solidFill>
+                  <a:schemeClr val="accent1"/>
+                </a:solidFill>
+                <a:latin typeface="Arial"/>
+                <a:ea typeface="Arial"/>
+                <a:cs typeface="Arial"/>
+                <a:sym typeface="Arial"/>
+              </a:rPr>
+              <a:t>working</a:t>
+            </a:r>
+            <a:r>
+              <a:rPr lang="fr-FR" sz="1400" b="0" i="0" u="none" strike="noStrike" cap="none" dirty="0">
+                <a:solidFill>
+                  <a:schemeClr val="accent1"/>
+                </a:solidFill>
+                <a:latin typeface="Arial"/>
+                <a:ea typeface="Arial"/>
+                <a:cs typeface="Arial"/>
+                <a:sym typeface="Arial"/>
+              </a:rPr>
+              <a:t> directory)</a:t>
+            </a:r>
+            <a:endParaRPr dirty="0"/>
+          </a:p>
+          <a:p>
+            <a:pPr marL="0" marR="0" lvl="0" indent="0" algn="l" rtl="0">
+              <a:spcBef>
+                <a:spcPts val="280"/>
+              </a:spcBef>
+              <a:spcAft>
+                <a:spcPts val="0"/>
+              </a:spcAft>
+              <a:buClr>
+                <a:schemeClr val="accent1"/>
+              </a:buClr>
+              <a:buFont typeface="Arial"/>
+              <a:buNone/>
+            </a:pPr>
+            <a:r>
+              <a:rPr lang="fr-FR" sz="1400" b="0" i="0" u="none" strike="noStrike" cap="none" dirty="0">
+                <a:solidFill>
+                  <a:schemeClr val="accent1"/>
+                </a:solidFill>
+                <a:latin typeface="Arial"/>
+                <a:ea typeface="Arial"/>
+                <a:cs typeface="Arial"/>
+                <a:sym typeface="Arial"/>
+              </a:rPr>
+              <a:t>#</a:t>
+            </a:r>
+            <a:endParaRPr dirty="0"/>
+          </a:p>
+          <a:p>
+            <a:pPr marL="0" marR="0" lvl="0" indent="0" algn="l" rtl="0">
+              <a:spcBef>
+                <a:spcPts val="280"/>
+              </a:spcBef>
+              <a:spcAft>
+                <a:spcPts val="0"/>
+              </a:spcAft>
+              <a:buClr>
+                <a:schemeClr val="accent1"/>
+              </a:buClr>
+              <a:buFont typeface="Arial"/>
+              <a:buNone/>
+            </a:pPr>
+            <a:r>
+              <a:rPr lang="fr-FR" sz="1400" b="0" i="0" u="none" strike="noStrike" cap="none" dirty="0">
+                <a:solidFill>
+                  <a:schemeClr val="accent1"/>
+                </a:solidFill>
+                <a:latin typeface="Arial"/>
+                <a:ea typeface="Arial"/>
+                <a:cs typeface="Arial"/>
+                <a:sym typeface="Arial"/>
+              </a:rPr>
+              <a:t>#	</a:t>
+            </a:r>
+            <a:r>
+              <a:rPr lang="fr-FR" sz="1400" b="0" i="0" u="none" strike="noStrike" cap="none" dirty="0" err="1">
+                <a:solidFill>
+                  <a:schemeClr val="accent1"/>
+                </a:solidFill>
+                <a:latin typeface="Arial"/>
+                <a:ea typeface="Arial"/>
+                <a:cs typeface="Arial"/>
+                <a:sym typeface="Arial"/>
+              </a:rPr>
+              <a:t>modified</a:t>
+            </a:r>
+            <a:r>
+              <a:rPr lang="fr-FR" sz="1400" b="0" i="0" u="none" strike="noStrike" cap="none" dirty="0">
+                <a:solidFill>
+                  <a:schemeClr val="accent1"/>
+                </a:solidFill>
+                <a:latin typeface="Arial"/>
+                <a:ea typeface="Arial"/>
+                <a:cs typeface="Arial"/>
+                <a:sym typeface="Arial"/>
+              </a:rPr>
+              <a:t>:   README.md</a:t>
+            </a:r>
+            <a:endParaRPr dirty="0"/>
+          </a:p>
+          <a:p>
+            <a:pPr marL="0" marR="0" lvl="0" indent="0" algn="l" rtl="0">
+              <a:spcBef>
+                <a:spcPts val="280"/>
+              </a:spcBef>
+              <a:spcAft>
+                <a:spcPts val="0"/>
+              </a:spcAft>
+              <a:buClr>
+                <a:schemeClr val="accent1"/>
+              </a:buClr>
+              <a:buFont typeface="Arial"/>
+              <a:buNone/>
+            </a:pPr>
+            <a:r>
+              <a:rPr lang="fr-FR" sz="1400" b="0" i="0" u="none" strike="noStrike" cap="none" dirty="0">
+                <a:solidFill>
+                  <a:schemeClr val="accent1"/>
+                </a:solidFill>
+                <a:latin typeface="Arial"/>
+                <a:ea typeface="Arial"/>
+                <a:cs typeface="Arial"/>
+                <a:sym typeface="Arial"/>
+              </a:rPr>
+              <a:t>#</a:t>
+            </a:r>
+            <a:endParaRPr dirty="0"/>
+          </a:p>
+          <a:p>
+            <a:pPr marL="0" marR="0" lvl="0" indent="0" algn="l" rtl="0">
+              <a:spcBef>
+                <a:spcPts val="280"/>
+              </a:spcBef>
+              <a:spcAft>
+                <a:spcPts val="0"/>
+              </a:spcAft>
+              <a:buClr>
+                <a:schemeClr val="accent1"/>
+              </a:buClr>
+              <a:buFont typeface="Arial"/>
+              <a:buNone/>
+            </a:pPr>
+            <a:r>
+              <a:rPr lang="fr-FR" sz="1400" b="0" i="0" u="none" strike="noStrike" cap="none" dirty="0">
+                <a:solidFill>
+                  <a:schemeClr val="accent1"/>
+                </a:solidFill>
+                <a:latin typeface="Arial"/>
+                <a:ea typeface="Arial"/>
+                <a:cs typeface="Arial"/>
+                <a:sym typeface="Arial"/>
+              </a:rPr>
+              <a:t>no changes </a:t>
+            </a:r>
+            <a:r>
+              <a:rPr lang="fr-FR" sz="1400" b="0" i="0" u="none" strike="noStrike" cap="none" dirty="0" err="1">
+                <a:solidFill>
+                  <a:schemeClr val="accent1"/>
+                </a:solidFill>
+                <a:latin typeface="Arial"/>
+                <a:ea typeface="Arial"/>
+                <a:cs typeface="Arial"/>
+                <a:sym typeface="Arial"/>
+              </a:rPr>
+              <a:t>added</a:t>
+            </a:r>
+            <a:r>
+              <a:rPr lang="fr-FR" sz="1400" b="0" i="0" u="none" strike="noStrike" cap="none" dirty="0">
+                <a:solidFill>
+                  <a:schemeClr val="accent1"/>
+                </a:solidFill>
+                <a:latin typeface="Arial"/>
+                <a:ea typeface="Arial"/>
+                <a:cs typeface="Arial"/>
+                <a:sym typeface="Arial"/>
+              </a:rPr>
+              <a:t> to commit (use "git </a:t>
+            </a:r>
+            <a:r>
+              <a:rPr lang="fr-FR" sz="1400" b="0" i="0" u="none" strike="noStrike" cap="none" dirty="0" err="1">
+                <a:solidFill>
+                  <a:schemeClr val="accent1"/>
+                </a:solidFill>
+                <a:latin typeface="Arial"/>
+                <a:ea typeface="Arial"/>
+                <a:cs typeface="Arial"/>
+                <a:sym typeface="Arial"/>
+              </a:rPr>
+              <a:t>add</a:t>
+            </a:r>
+            <a:r>
+              <a:rPr lang="fr-FR" sz="1400" b="0" i="0" u="none" strike="noStrike" cap="none" dirty="0">
+                <a:solidFill>
+                  <a:schemeClr val="accent1"/>
+                </a:solidFill>
+                <a:latin typeface="Arial"/>
+                <a:ea typeface="Arial"/>
+                <a:cs typeface="Arial"/>
+                <a:sym typeface="Arial"/>
+              </a:rPr>
+              <a:t>" and/or "git commit -a")</a:t>
+            </a:r>
+            <a:endParaRPr dirty="0"/>
+          </a:p>
+          <a:p>
+            <a:pPr marL="0" marR="0" lvl="0" indent="0" algn="l" rtl="0">
+              <a:spcBef>
+                <a:spcPts val="280"/>
+              </a:spcBef>
+              <a:spcAft>
+                <a:spcPts val="0"/>
+              </a:spcAft>
+              <a:buClr>
+                <a:schemeClr val="accent1"/>
+              </a:buClr>
+              <a:buFont typeface="Arial"/>
+              <a:buNone/>
+            </a:pPr>
+            <a:r>
+              <a:rPr lang="fr-FR" sz="1400" b="0" i="0" u="none" strike="noStrike" cap="none" dirty="0">
+                <a:solidFill>
+                  <a:schemeClr val="accent1"/>
+                </a:solidFill>
+                <a:latin typeface="Arial"/>
+                <a:ea typeface="Arial"/>
+                <a:cs typeface="Arial"/>
+                <a:sym typeface="Arial"/>
+              </a:rPr>
+              <a:t>$ git </a:t>
+            </a:r>
+            <a:r>
+              <a:rPr lang="fr-FR" sz="1400" b="0" i="0" u="none" strike="noStrike" cap="none" dirty="0" err="1">
+                <a:solidFill>
+                  <a:schemeClr val="accent1"/>
+                </a:solidFill>
+                <a:latin typeface="Arial"/>
+                <a:ea typeface="Arial"/>
+                <a:cs typeface="Arial"/>
+                <a:sym typeface="Arial"/>
+              </a:rPr>
+              <a:t>diff</a:t>
+            </a:r>
+            <a:endParaRPr dirty="0"/>
+          </a:p>
+          <a:p>
+            <a:pPr marL="0" marR="0" lvl="0" indent="0" algn="l" rtl="0">
+              <a:spcBef>
+                <a:spcPts val="280"/>
+              </a:spcBef>
+              <a:spcAft>
+                <a:spcPts val="0"/>
+              </a:spcAft>
+              <a:buClr>
+                <a:schemeClr val="accent1"/>
+              </a:buClr>
+              <a:buFont typeface="Arial"/>
+              <a:buNone/>
+            </a:pPr>
+            <a:r>
+              <a:rPr lang="fr-FR" sz="1400" b="0" i="0" u="none" strike="noStrike" cap="none" dirty="0" err="1">
+                <a:solidFill>
+                  <a:schemeClr val="accent1"/>
+                </a:solidFill>
+                <a:latin typeface="Arial"/>
+                <a:ea typeface="Arial"/>
+                <a:cs typeface="Arial"/>
+                <a:sym typeface="Arial"/>
+              </a:rPr>
+              <a:t>diff</a:t>
+            </a:r>
+            <a:r>
+              <a:rPr lang="fr-FR" sz="1400" b="0" i="0" u="none" strike="noStrike" cap="none" dirty="0">
+                <a:solidFill>
+                  <a:schemeClr val="accent1"/>
+                </a:solidFill>
+                <a:latin typeface="Arial"/>
+                <a:ea typeface="Arial"/>
+                <a:cs typeface="Arial"/>
+                <a:sym typeface="Arial"/>
+              </a:rPr>
+              <a:t> --git a/README.md b/README.md</a:t>
+            </a:r>
+            <a:endParaRPr dirty="0"/>
+          </a:p>
+          <a:p>
+            <a:pPr marL="0" marR="0" lvl="0" indent="0" algn="l" rtl="0">
+              <a:spcBef>
+                <a:spcPts val="280"/>
+              </a:spcBef>
+              <a:spcAft>
+                <a:spcPts val="0"/>
+              </a:spcAft>
+              <a:buClr>
+                <a:schemeClr val="accent1"/>
+              </a:buClr>
+              <a:buFont typeface="Arial"/>
+              <a:buNone/>
+            </a:pPr>
+            <a:r>
+              <a:rPr lang="fr-FR" sz="1400" b="0" i="0" u="none" strike="noStrike" cap="none" dirty="0">
+                <a:solidFill>
+                  <a:schemeClr val="accent1"/>
+                </a:solidFill>
+                <a:latin typeface="Arial"/>
+                <a:ea typeface="Arial"/>
+                <a:cs typeface="Arial"/>
+                <a:sym typeface="Arial"/>
+              </a:rPr>
+              <a:t>index bb69143..91a4a14 100644</a:t>
+            </a:r>
+            <a:endParaRPr dirty="0"/>
+          </a:p>
+          <a:p>
+            <a:pPr marL="0" marR="0" lvl="0" indent="0" algn="l" rtl="0">
+              <a:spcBef>
+                <a:spcPts val="280"/>
+              </a:spcBef>
+              <a:spcAft>
+                <a:spcPts val="0"/>
+              </a:spcAft>
+              <a:buClr>
+                <a:schemeClr val="accent1"/>
+              </a:buClr>
+              <a:buFont typeface="Arial"/>
+              <a:buNone/>
+            </a:pPr>
+            <a:r>
+              <a:rPr lang="fr-FR" sz="1400" b="0" i="0" u="none" strike="noStrike" cap="none" dirty="0">
+                <a:solidFill>
+                  <a:schemeClr val="accent1"/>
+                </a:solidFill>
+                <a:latin typeface="Arial"/>
+                <a:ea typeface="Arial"/>
+                <a:cs typeface="Arial"/>
+                <a:sym typeface="Arial"/>
+              </a:rPr>
+              <a:t>--- a/README.md</a:t>
+            </a:r>
+            <a:endParaRPr dirty="0"/>
+          </a:p>
+          <a:p>
+            <a:pPr marL="0" marR="0" lvl="0" indent="0" algn="l" rtl="0">
+              <a:spcBef>
+                <a:spcPts val="280"/>
+              </a:spcBef>
+              <a:spcAft>
+                <a:spcPts val="0"/>
+              </a:spcAft>
+              <a:buClr>
+                <a:schemeClr val="accent1"/>
+              </a:buClr>
+              <a:buFont typeface="Arial"/>
+              <a:buNone/>
+            </a:pPr>
+            <a:r>
+              <a:rPr lang="fr-FR" sz="1400" b="0" i="0" u="none" strike="noStrike" cap="none" dirty="0">
+                <a:solidFill>
+                  <a:schemeClr val="accent1"/>
+                </a:solidFill>
+                <a:latin typeface="Arial"/>
+                <a:ea typeface="Arial"/>
+                <a:cs typeface="Arial"/>
+                <a:sym typeface="Arial"/>
+              </a:rPr>
+              <a:t>+++ b/README.md</a:t>
+            </a:r>
+            <a:endParaRPr dirty="0"/>
+          </a:p>
+          <a:p>
+            <a:pPr marL="0" marR="0" lvl="0" indent="0" algn="l" rtl="0">
+              <a:spcBef>
+                <a:spcPts val="280"/>
+              </a:spcBef>
+              <a:spcAft>
+                <a:spcPts val="0"/>
+              </a:spcAft>
+              <a:buClr>
+                <a:schemeClr val="accent1"/>
+              </a:buClr>
+              <a:buFont typeface="Arial"/>
+              <a:buNone/>
+            </a:pPr>
+            <a:r>
+              <a:rPr lang="fr-FR" sz="1400" b="0" i="0" u="none" strike="noStrike" cap="none" dirty="0">
+                <a:solidFill>
+                  <a:schemeClr val="accent1"/>
+                </a:solidFill>
+                <a:latin typeface="Arial"/>
+                <a:ea typeface="Arial"/>
+                <a:cs typeface="Arial"/>
+                <a:sym typeface="Arial"/>
+              </a:rPr>
+              <a:t>@@ -1 +1,2 @@</a:t>
+            </a:r>
+            <a:endParaRPr dirty="0"/>
+          </a:p>
+          <a:p>
+            <a:pPr marL="0" marR="0" lvl="0" indent="0" algn="l" rtl="0">
+              <a:spcBef>
+                <a:spcPts val="280"/>
+              </a:spcBef>
+              <a:spcAft>
+                <a:spcPts val="0"/>
+              </a:spcAft>
+              <a:buClr>
+                <a:schemeClr val="accent1"/>
+              </a:buClr>
+              <a:buFont typeface="Arial"/>
+              <a:buNone/>
+            </a:pPr>
+            <a:r>
+              <a:rPr lang="fr-FR" sz="1400" b="0" i="0" u="none" strike="noStrike" cap="none" dirty="0">
+                <a:solidFill>
+                  <a:schemeClr val="accent1"/>
+                </a:solidFill>
+                <a:latin typeface="Arial"/>
+                <a:ea typeface="Arial"/>
+                <a:cs typeface="Arial"/>
+                <a:sym typeface="Arial"/>
+              </a:rPr>
+              <a:t> This </a:t>
+            </a:r>
+            <a:r>
+              <a:rPr lang="fr-FR" sz="1400" b="0" i="0" u="none" strike="noStrike" cap="none" dirty="0" err="1">
+                <a:solidFill>
+                  <a:schemeClr val="accent1"/>
+                </a:solidFill>
+                <a:latin typeface="Arial"/>
+                <a:ea typeface="Arial"/>
+                <a:cs typeface="Arial"/>
+                <a:sym typeface="Arial"/>
+              </a:rPr>
+              <a:t>is</a:t>
+            </a:r>
+            <a:r>
+              <a:rPr lang="fr-FR" sz="1400" b="0" i="0" u="none" strike="noStrike" cap="none" dirty="0">
+                <a:solidFill>
+                  <a:schemeClr val="accent1"/>
+                </a:solidFill>
+                <a:latin typeface="Arial"/>
+                <a:ea typeface="Arial"/>
+                <a:cs typeface="Arial"/>
+                <a:sym typeface="Arial"/>
+              </a:rPr>
+              <a:t> a README.md file for </a:t>
+            </a:r>
+            <a:r>
+              <a:rPr lang="fr-FR" sz="1400" b="0" i="0" u="none" strike="noStrike" cap="none" dirty="0" err="1">
+                <a:solidFill>
+                  <a:schemeClr val="accent1"/>
+                </a:solidFill>
+                <a:latin typeface="Arial"/>
+                <a:ea typeface="Arial"/>
+                <a:cs typeface="Arial"/>
+                <a:sym typeface="Arial"/>
+              </a:rPr>
+              <a:t>our</a:t>
+            </a:r>
+            <a:r>
+              <a:rPr lang="fr-FR" sz="1400" b="0" i="0" u="none" strike="noStrike" cap="none" dirty="0">
+                <a:solidFill>
+                  <a:schemeClr val="accent1"/>
+                </a:solidFill>
+                <a:latin typeface="Arial"/>
+                <a:ea typeface="Arial"/>
+                <a:cs typeface="Arial"/>
+                <a:sym typeface="Arial"/>
+              </a:rPr>
+              <a:t> git </a:t>
+            </a:r>
+            <a:r>
+              <a:rPr lang="fr-FR" sz="1400" b="0" i="0" u="none" strike="noStrike" cap="none" dirty="0" err="1">
+                <a:solidFill>
+                  <a:schemeClr val="accent1"/>
+                </a:solidFill>
+                <a:latin typeface="Arial"/>
+                <a:ea typeface="Arial"/>
+                <a:cs typeface="Arial"/>
+                <a:sym typeface="Arial"/>
+              </a:rPr>
+              <a:t>exercise</a:t>
+            </a:r>
+            <a:endParaRPr dirty="0"/>
+          </a:p>
+          <a:p>
+            <a:pPr marL="0" marR="0" lvl="0" indent="0" algn="l" rtl="0">
+              <a:spcBef>
+                <a:spcPts val="280"/>
+              </a:spcBef>
+              <a:spcAft>
+                <a:spcPts val="0"/>
+              </a:spcAft>
+              <a:buClr>
+                <a:schemeClr val="accent1"/>
+              </a:buClr>
+              <a:buFont typeface="Arial"/>
+              <a:buNone/>
+            </a:pPr>
+            <a:r>
+              <a:rPr lang="fr-FR" sz="1400" b="0" i="0" u="none" strike="noStrike" cap="none" dirty="0">
+                <a:solidFill>
+                  <a:schemeClr val="accent1"/>
+                </a:solidFill>
+                <a:latin typeface="Arial"/>
+                <a:ea typeface="Arial"/>
+                <a:cs typeface="Arial"/>
+                <a:sym typeface="Arial"/>
+              </a:rPr>
+              <a:t>+Bad </a:t>
+            </a:r>
+            <a:r>
+              <a:rPr lang="fr-FR" sz="1400" b="0" i="0" u="none" strike="noStrike" cap="none" dirty="0" err="1">
+                <a:solidFill>
+                  <a:schemeClr val="accent1"/>
+                </a:solidFill>
+                <a:latin typeface="Arial"/>
+                <a:ea typeface="Arial"/>
+                <a:cs typeface="Arial"/>
+                <a:sym typeface="Arial"/>
+              </a:rPr>
+              <a:t>developer</a:t>
+            </a:r>
+            <a:r>
+              <a:rPr lang="fr-FR" sz="1400" b="0" i="0" u="none" strike="noStrike" cap="none" dirty="0">
+                <a:solidFill>
+                  <a:schemeClr val="accent1"/>
+                </a:solidFill>
+                <a:latin typeface="Arial"/>
+                <a:ea typeface="Arial"/>
+                <a:cs typeface="Arial"/>
+                <a:sym typeface="Arial"/>
+              </a:rPr>
+              <a:t> joker</a:t>
+            </a:r>
+            <a:endParaRPr dirty="0"/>
           </a:p>
         </p:txBody>
       </p:sp>
@@ -14425,6 +14905,13 @@
   <p:clrMapOvr>
     <a:masterClrMapping/>
   </p:clrMapOvr>
+  <p:timing>
+    <p:tnLst>
+      <p:par>
+        <p:cTn id="1" dur="indefinite" restart="never" nodeType="tmRoot"/>
+      </p:par>
+    </p:tnLst>
+  </p:timing>
 </p:sld>
 </file>
 
@@ -14945,6 +15432,13 @@
   <p:clrMapOvr>
     <a:masterClrMapping/>
   </p:clrMapOvr>
+  <p:timing>
+    <p:tnLst>
+      <p:par>
+        <p:cTn id="1" dur="indefinite" restart="never" nodeType="tmRoot"/>
+      </p:par>
+    </p:tnLst>
+  </p:timing>
 </p:sld>
 </file>
 
@@ -24685,7 +25179,7 @@
               <a:buNone/>
             </a:pPr>
             <a:r>
-              <a:rPr lang="fr-FR" sz="2960">
+              <a:rPr lang="fr-FR" sz="2960" dirty="0" err="1">
                 <a:solidFill>
                   <a:schemeClr val="accent1"/>
                 </a:solidFill>
@@ -24694,9 +25188,33 @@
                 <a:cs typeface="Helvetica Neue"/>
                 <a:sym typeface="Helvetica Neue"/>
               </a:rPr>
-              <a:t>Before coding</a:t>
-            </a:r>
-            <a:endParaRPr sz="3200">
+              <a:t>Before</a:t>
+            </a:r>
+            <a:r>
+              <a:rPr lang="fr-FR" sz="2960" dirty="0">
+                <a:solidFill>
+                  <a:schemeClr val="accent1"/>
+                </a:solidFill>
+                <a:latin typeface="Helvetica Neue"/>
+                <a:ea typeface="Helvetica Neue"/>
+                <a:cs typeface="Helvetica Neue"/>
+                <a:sym typeface="Helvetica Neue"/>
+              </a:rPr>
+              <a:t> </a:t>
+            </a:r>
+            <a:r>
+              <a:rPr lang="fr-FR" sz="2960" dirty="0" err="1">
+                <a:solidFill>
+                  <a:schemeClr val="accent1"/>
+                </a:solidFill>
+                <a:latin typeface="Helvetica Neue"/>
+                <a:ea typeface="Helvetica Neue"/>
+                <a:cs typeface="Helvetica Neue"/>
+                <a:sym typeface="Helvetica Neue"/>
+              </a:rPr>
+              <a:t>coding</a:t>
+            </a:r>
+            <a:endParaRPr sz="3200" dirty="0">
               <a:solidFill>
                 <a:schemeClr val="accent1"/>
               </a:solidFill>
@@ -24725,7 +25243,7 @@
               <a:buChar char="–"/>
             </a:pPr>
             <a:r>
-              <a:rPr lang="fr-FR" sz="2590" b="1">
+              <a:rPr lang="fr-FR" sz="2590" b="1" dirty="0">
                 <a:solidFill>
                   <a:schemeClr val="dk1"/>
                 </a:solidFill>
@@ -24737,7 +25255,7 @@
               <a:t>ALWAYS </a:t>
             </a:r>
             <a:r>
-              <a:rPr lang="fr-FR" sz="2590">
+              <a:rPr lang="fr-FR" sz="2590" dirty="0">
                 <a:solidFill>
                   <a:schemeClr val="dk1"/>
                 </a:solidFill>
@@ -24746,9 +25264,33 @@
                 <a:cs typeface="Helvetica Neue"/>
                 <a:sym typeface="Helvetica Neue"/>
               </a:rPr>
-              <a:t>pull latest changes</a:t>
-            </a:r>
-            <a:endParaRPr sz="2590">
+              <a:t>pull </a:t>
+            </a:r>
+            <a:r>
+              <a:rPr lang="fr-FR" sz="2590" dirty="0" err="1">
+                <a:solidFill>
+                  <a:schemeClr val="dk1"/>
+                </a:solidFill>
+                <a:latin typeface="Helvetica Neue"/>
+                <a:ea typeface="Helvetica Neue"/>
+                <a:cs typeface="Helvetica Neue"/>
+                <a:sym typeface="Helvetica Neue"/>
+              </a:rPr>
+              <a:t>latest</a:t>
+            </a:r>
+            <a:r>
+              <a:rPr lang="fr-FR" sz="2590" dirty="0">
+                <a:solidFill>
+                  <a:schemeClr val="dk1"/>
+                </a:solidFill>
+                <a:latin typeface="Helvetica Neue"/>
+                <a:ea typeface="Helvetica Neue"/>
+                <a:cs typeface="Helvetica Neue"/>
+                <a:sym typeface="Helvetica Neue"/>
+              </a:rPr>
+              <a:t> changes</a:t>
+            </a:r>
+            <a:endParaRPr sz="2590" dirty="0">
               <a:solidFill>
                 <a:schemeClr val="dk1"/>
               </a:solidFill>
@@ -24777,7 +25319,7 @@
               <a:buChar char="–"/>
             </a:pPr>
             <a:r>
-              <a:rPr lang="fr-FR" sz="2400">
+              <a:rPr lang="fr-FR" sz="2400" dirty="0">
                 <a:solidFill>
                   <a:schemeClr val="dk1"/>
                 </a:solidFill>
@@ -24786,9 +25328,33 @@
                 <a:cs typeface="Helvetica Neue"/>
                 <a:sym typeface="Helvetica Neue"/>
               </a:rPr>
-              <a:t>git pull origin master</a:t>
-            </a:r>
-            <a:endParaRPr sz="2400">
+              <a:t>git pull </a:t>
+            </a:r>
+            <a:r>
+              <a:rPr lang="fr-FR" sz="2400" dirty="0" err="1">
+                <a:solidFill>
+                  <a:schemeClr val="dk1"/>
+                </a:solidFill>
+                <a:latin typeface="Helvetica Neue"/>
+                <a:ea typeface="Helvetica Neue"/>
+                <a:cs typeface="Helvetica Neue"/>
+                <a:sym typeface="Helvetica Neue"/>
+              </a:rPr>
+              <a:t>origin</a:t>
+            </a:r>
+            <a:r>
+              <a:rPr lang="fr-FR" sz="2400" dirty="0">
+                <a:solidFill>
+                  <a:schemeClr val="dk1"/>
+                </a:solidFill>
+                <a:latin typeface="Helvetica Neue"/>
+                <a:ea typeface="Helvetica Neue"/>
+                <a:cs typeface="Helvetica Neue"/>
+                <a:sym typeface="Helvetica Neue"/>
+              </a:rPr>
+              <a:t> master</a:t>
+            </a:r>
+            <a:endParaRPr sz="2400" dirty="0">
               <a:solidFill>
                 <a:schemeClr val="dk1"/>
               </a:solidFill>
@@ -24812,7 +25378,7 @@
               <a:buNone/>
             </a:pPr>
             <a:r>
-              <a:rPr lang="fr-FR" sz="2960">
+              <a:rPr lang="fr-FR" sz="2960" dirty="0">
                 <a:solidFill>
                   <a:schemeClr val="accent1"/>
                 </a:solidFill>
@@ -24824,7 +25390,7 @@
               <a:t/>
             </a:r>
             <a:br>
-              <a:rPr lang="fr-FR" sz="2960">
+              <a:rPr lang="fr-FR" sz="2960" dirty="0">
                 <a:solidFill>
                   <a:schemeClr val="accent1"/>
                 </a:solidFill>
@@ -24835,7 +25401,7 @@
               </a:rPr>
             </a:br>
             <a:r>
-              <a:rPr lang="fr-FR" sz="2960">
+              <a:rPr lang="fr-FR" sz="2960" dirty="0" err="1">
                 <a:solidFill>
                   <a:schemeClr val="accent1"/>
                 </a:solidFill>
@@ -24844,9 +25410,57 @@
                 <a:cs typeface="Helvetica Neue"/>
                 <a:sym typeface="Helvetica Neue"/>
               </a:rPr>
-              <a:t>Before pushing commits</a:t>
-            </a:r>
-            <a:endParaRPr sz="2960">
+              <a:t>Before</a:t>
+            </a:r>
+            <a:r>
+              <a:rPr lang="fr-FR" sz="2960" dirty="0">
+                <a:solidFill>
+                  <a:schemeClr val="accent1"/>
+                </a:solidFill>
+                <a:latin typeface="Helvetica Neue"/>
+                <a:ea typeface="Helvetica Neue"/>
+                <a:cs typeface="Helvetica Neue"/>
+                <a:sym typeface="Helvetica Neue"/>
+              </a:rPr>
+              <a:t> </a:t>
+            </a:r>
+            <a:r>
+              <a:rPr lang="fr-FR" sz="2960" dirty="0" err="1">
+                <a:solidFill>
+                  <a:schemeClr val="accent1"/>
+                </a:solidFill>
+                <a:latin typeface="Helvetica Neue"/>
+                <a:ea typeface="Helvetica Neue"/>
+                <a:cs typeface="Helvetica Neue"/>
+                <a:sym typeface="Helvetica Neue"/>
+              </a:rPr>
+              <a:t>pushing</a:t>
+            </a:r>
+            <a:r>
+              <a:rPr lang="fr-FR" sz="2960" dirty="0">
+                <a:solidFill>
+                  <a:schemeClr val="accent1"/>
+                </a:solidFill>
+                <a:latin typeface="Helvetica Neue"/>
+                <a:ea typeface="Helvetica Neue"/>
+                <a:cs typeface="Helvetica Neue"/>
+                <a:sym typeface="Helvetica Neue"/>
+              </a:rPr>
+              <a:t> </a:t>
+            </a:r>
+            <a:r>
+              <a:rPr lang="fr-FR" sz="2960" dirty="0" err="1">
+                <a:solidFill>
+                  <a:schemeClr val="accent1"/>
+                </a:solidFill>
+                <a:latin typeface="Helvetica Neue"/>
+                <a:ea typeface="Helvetica Neue"/>
+                <a:cs typeface="Helvetica Neue"/>
+                <a:sym typeface="Helvetica Neue"/>
+              </a:rPr>
+              <a:t>commits</a:t>
+            </a:r>
+            <a:endParaRPr sz="2960" dirty="0">
               <a:solidFill>
                 <a:schemeClr val="accent1"/>
               </a:solidFill>
@@ -24875,7 +25489,7 @@
               <a:buChar char="–"/>
             </a:pPr>
             <a:r>
-              <a:rPr lang="fr-FR" sz="2590" b="1">
+              <a:rPr lang="fr-FR" sz="2590" b="1" dirty="0">
                 <a:solidFill>
                   <a:schemeClr val="dk1"/>
                 </a:solidFill>
@@ -24887,7 +25501,7 @@
               <a:t>ALWAYS </a:t>
             </a:r>
             <a:r>
-              <a:rPr lang="fr-FR" sz="2590">
+              <a:rPr lang="fr-FR" sz="2590" dirty="0" smtClean="0">
                 <a:solidFill>
                   <a:schemeClr val="dk1"/>
                 </a:solidFill>
@@ -24896,9 +25510,33 @@
                 <a:cs typeface="Helvetica Neue"/>
                 <a:sym typeface="Helvetica Neue"/>
               </a:rPr>
-              <a:t>pull latest changes</a:t>
-            </a:r>
-            <a:endParaRPr sz="2590">
+              <a:t>push </a:t>
+            </a:r>
+            <a:r>
+              <a:rPr lang="fr-FR" sz="2590" dirty="0" err="1">
+                <a:solidFill>
+                  <a:schemeClr val="dk1"/>
+                </a:solidFill>
+                <a:latin typeface="Helvetica Neue"/>
+                <a:ea typeface="Helvetica Neue"/>
+                <a:cs typeface="Helvetica Neue"/>
+                <a:sym typeface="Helvetica Neue"/>
+              </a:rPr>
+              <a:t>latest</a:t>
+            </a:r>
+            <a:r>
+              <a:rPr lang="fr-FR" sz="2590" dirty="0">
+                <a:solidFill>
+                  <a:schemeClr val="dk1"/>
+                </a:solidFill>
+                <a:latin typeface="Helvetica Neue"/>
+                <a:ea typeface="Helvetica Neue"/>
+                <a:cs typeface="Helvetica Neue"/>
+                <a:sym typeface="Helvetica Neue"/>
+              </a:rPr>
+              <a:t> changes</a:t>
+            </a:r>
+            <a:endParaRPr sz="2590" dirty="0">
               <a:solidFill>
                 <a:schemeClr val="dk1"/>
               </a:solidFill>
@@ -24927,7 +25565,7 @@
               <a:buChar char="–"/>
             </a:pPr>
             <a:r>
-              <a:rPr lang="fr-FR" sz="2400">
+              <a:rPr lang="fr-FR" sz="2400" dirty="0">
                 <a:solidFill>
                   <a:srgbClr val="24292E"/>
                 </a:solidFill>
@@ -24936,9 +25574,33 @@
                 <a:cs typeface="Helvetica Neue"/>
                 <a:sym typeface="Helvetica Neue"/>
               </a:rPr>
-              <a:t>git push origin master</a:t>
-            </a:r>
-            <a:endParaRPr sz="2400">
+              <a:t>git push </a:t>
+            </a:r>
+            <a:r>
+              <a:rPr lang="fr-FR" sz="2400" dirty="0" err="1">
+                <a:solidFill>
+                  <a:srgbClr val="24292E"/>
+                </a:solidFill>
+                <a:latin typeface="Helvetica Neue"/>
+                <a:ea typeface="Helvetica Neue"/>
+                <a:cs typeface="Helvetica Neue"/>
+                <a:sym typeface="Helvetica Neue"/>
+              </a:rPr>
+              <a:t>origin</a:t>
+            </a:r>
+            <a:r>
+              <a:rPr lang="fr-FR" sz="2400" dirty="0">
+                <a:solidFill>
+                  <a:srgbClr val="24292E"/>
+                </a:solidFill>
+                <a:latin typeface="Helvetica Neue"/>
+                <a:ea typeface="Helvetica Neue"/>
+                <a:cs typeface="Helvetica Neue"/>
+                <a:sym typeface="Helvetica Neue"/>
+              </a:rPr>
+              <a:t> master</a:t>
+            </a:r>
+            <a:endParaRPr sz="2400" dirty="0">
               <a:solidFill>
                 <a:srgbClr val="24292E"/>
               </a:solidFill>
@@ -24961,7 +25623,7 @@
               </a:spcAft>
               <a:buNone/>
             </a:pPr>
-            <a:endParaRPr sz="2960">
+            <a:endParaRPr sz="2960" dirty="0">
               <a:solidFill>
                 <a:schemeClr val="accent1"/>
               </a:solidFill>
@@ -29509,7 +30171,7 @@
               <a:buNone/>
             </a:pPr>
             <a:r>
-              <a:rPr lang="fr-FR" sz="3200" b="0" i="0" u="none" strike="noStrike" cap="none">
+              <a:rPr lang="fr-FR" sz="3200" b="0" i="0" u="none" strike="noStrike" cap="none" dirty="0" err="1">
                 <a:solidFill>
                   <a:schemeClr val="accent1"/>
                 </a:solidFill>
@@ -29518,10 +30180,70 @@
                 <a:cs typeface="Helvetica Neue"/>
                 <a:sym typeface="Helvetica Neue"/>
               </a:rPr>
-              <a:t>Create a README.md file with some content</a:t>
-            </a:r>
-            <a:r>
-              <a:rPr lang="fr-FR">
+              <a:t>Create</a:t>
+            </a:r>
+            <a:r>
+              <a:rPr lang="fr-FR" sz="3200" b="0" i="0" u="none" strike="noStrike" cap="none" dirty="0">
+                <a:solidFill>
+                  <a:schemeClr val="accent1"/>
+                </a:solidFill>
+                <a:latin typeface="Helvetica Neue"/>
+                <a:ea typeface="Helvetica Neue"/>
+                <a:cs typeface="Helvetica Neue"/>
+                <a:sym typeface="Helvetica Neue"/>
+              </a:rPr>
+              <a:t> a README.md file </a:t>
+            </a:r>
+            <a:r>
+              <a:rPr lang="fr-FR" sz="3200" b="0" i="0" u="none" strike="noStrike" cap="none" dirty="0" err="1">
+                <a:solidFill>
+                  <a:schemeClr val="accent1"/>
+                </a:solidFill>
+                <a:latin typeface="Helvetica Neue"/>
+                <a:ea typeface="Helvetica Neue"/>
+                <a:cs typeface="Helvetica Neue"/>
+                <a:sym typeface="Helvetica Neue"/>
+              </a:rPr>
+              <a:t>with</a:t>
+            </a:r>
+            <a:r>
+              <a:rPr lang="fr-FR" sz="3200" b="0" i="0" u="none" strike="noStrike" cap="none" dirty="0">
+                <a:solidFill>
+                  <a:schemeClr val="accent1"/>
+                </a:solidFill>
+                <a:latin typeface="Helvetica Neue"/>
+                <a:ea typeface="Helvetica Neue"/>
+                <a:cs typeface="Helvetica Neue"/>
+                <a:sym typeface="Helvetica Neue"/>
+              </a:rPr>
+              <a:t> </a:t>
+            </a:r>
+            <a:r>
+              <a:rPr lang="fr-FR" sz="3200" b="0" i="0" u="none" strike="noStrike" cap="none" dirty="0" err="1">
+                <a:solidFill>
+                  <a:schemeClr val="accent1"/>
+                </a:solidFill>
+                <a:latin typeface="Helvetica Neue"/>
+                <a:ea typeface="Helvetica Neue"/>
+                <a:cs typeface="Helvetica Neue"/>
+                <a:sym typeface="Helvetica Neue"/>
+              </a:rPr>
+              <a:t>some</a:t>
+            </a:r>
+            <a:r>
+              <a:rPr lang="fr-FR" sz="3200" b="0" i="0" u="none" strike="noStrike" cap="none" dirty="0">
+                <a:solidFill>
+                  <a:schemeClr val="accent1"/>
+                </a:solidFill>
+                <a:latin typeface="Helvetica Neue"/>
+                <a:ea typeface="Helvetica Neue"/>
+                <a:cs typeface="Helvetica Neue"/>
+                <a:sym typeface="Helvetica Neue"/>
+              </a:rPr>
+              <a:t> content</a:t>
+            </a:r>
+            <a:r>
+              <a:rPr lang="fr-FR" dirty="0">
                 <a:latin typeface="Arial"/>
                 <a:ea typeface="Arial"/>
                 <a:cs typeface="Arial"/>
@@ -29529,7 +30251,7 @@
               </a:rPr>
               <a:t>  </a:t>
             </a:r>
-            <a:endParaRPr>
+            <a:endParaRPr dirty="0">
               <a:latin typeface="Arial"/>
               <a:ea typeface="Arial"/>
               <a:cs typeface="Arial"/>
@@ -29552,15 +30274,60 @@
               <a:buChar char="–"/>
             </a:pPr>
             <a:r>
-              <a:rPr lang="fr-FR">
+              <a:rPr lang="fr-FR" dirty="0" err="1">
                 <a:latin typeface="Arial"/>
                 <a:ea typeface="Arial"/>
                 <a:cs typeface="Arial"/>
                 <a:sym typeface="Arial"/>
               </a:rPr>
-              <a:t>echo This is the readme &gt;&gt; README.md </a:t>
-            </a:r>
-            <a:endParaRPr>
+              <a:t>echo</a:t>
+            </a:r>
+            <a:r>
+              <a:rPr lang="fr-FR" dirty="0">
+                <a:latin typeface="Arial"/>
+                <a:ea typeface="Arial"/>
+                <a:cs typeface="Arial"/>
+                <a:sym typeface="Arial"/>
+              </a:rPr>
+              <a:t> This </a:t>
+            </a:r>
+            <a:r>
+              <a:rPr lang="fr-FR" dirty="0" err="1">
+                <a:latin typeface="Arial"/>
+                <a:ea typeface="Arial"/>
+                <a:cs typeface="Arial"/>
+                <a:sym typeface="Arial"/>
+              </a:rPr>
+              <a:t>is</a:t>
+            </a:r>
+            <a:r>
+              <a:rPr lang="fr-FR" dirty="0">
+                <a:latin typeface="Arial"/>
+                <a:ea typeface="Arial"/>
+                <a:cs typeface="Arial"/>
+                <a:sym typeface="Arial"/>
+              </a:rPr>
+              <a:t> the </a:t>
+            </a:r>
+            <a:r>
+              <a:rPr lang="fr-FR" dirty="0" err="1">
+                <a:latin typeface="Arial"/>
+                <a:ea typeface="Arial"/>
+                <a:cs typeface="Arial"/>
+                <a:sym typeface="Arial"/>
+              </a:rPr>
+              <a:t>readme</a:t>
+            </a:r>
+            <a:r>
+              <a:rPr lang="fr-FR" dirty="0">
+                <a:latin typeface="Arial"/>
+                <a:ea typeface="Arial"/>
+                <a:cs typeface="Arial"/>
+                <a:sym typeface="Arial"/>
+              </a:rPr>
+              <a:t> &gt;&gt; README.md </a:t>
+            </a:r>
+            <a:endParaRPr dirty="0">
               <a:latin typeface="Arial"/>
               <a:ea typeface="Arial"/>
               <a:cs typeface="Arial"/>
@@ -29583,7 +30350,7 @@
               <a:buChar char="–"/>
             </a:pPr>
             <a:r>
-              <a:rPr lang="fr-FR" sz="2800" b="0" i="0" u="none" strike="noStrike" cap="none">
+              <a:rPr lang="fr-FR" sz="2800" b="0" i="0" u="none" strike="noStrike" cap="none" dirty="0">
                 <a:solidFill>
                   <a:schemeClr val="dk1"/>
                 </a:solidFill>
@@ -29592,27 +30359,10 @@
                 <a:cs typeface="Arial"/>
                 <a:sym typeface="Arial"/>
               </a:rPr>
-              <a:t>git status</a:t>
-            </a:r>
-            <a:endParaRPr/>
-          </a:p>
-          <a:p>
-            <a:pPr marL="453599" marR="0" lvl="1" indent="-288499" algn="l" rtl="0">
-              <a:spcBef>
-                <a:spcPts val="560"/>
-              </a:spcBef>
-              <a:spcAft>
-                <a:spcPts val="0"/>
-              </a:spcAft>
-              <a:buClr>
-                <a:schemeClr val="accent1"/>
-              </a:buClr>
-              <a:buSzPts val="2800"/>
-              <a:buFont typeface="Arial"/>
-              <a:buChar char="–"/>
-            </a:pPr>
-            <a:r>
-              <a:rPr lang="fr-FR" sz="2800" b="0" i="0" u="none" strike="noStrike" cap="none">
+              <a:t>git </a:t>
+            </a:r>
+            <a:r>
+              <a:rPr lang="fr-FR" sz="2800" b="0" i="0" u="none" strike="noStrike" cap="none" dirty="0" err="1">
                 <a:solidFill>
                   <a:schemeClr val="dk1"/>
                 </a:solidFill>
@@ -29621,36 +30371,39 @@
                 <a:cs typeface="Arial"/>
                 <a:sym typeface="Arial"/>
               </a:rPr>
-              <a:t>git add README.m</a:t>
-            </a:r>
-            <a:r>
-              <a:rPr lang="fr-FR">
+              <a:t>status</a:t>
+            </a:r>
+            <a:endParaRPr dirty="0"/>
+          </a:p>
+          <a:p>
+            <a:pPr marL="453599" marR="0" lvl="1" indent="-288499" algn="l" rtl="0">
+              <a:spcBef>
+                <a:spcPts val="560"/>
+              </a:spcBef>
+              <a:spcAft>
+                <a:spcPts val="0"/>
+              </a:spcAft>
+              <a:buClr>
+                <a:schemeClr val="accent1"/>
+              </a:buClr>
+              <a:buSzPts val="2800"/>
+              <a:buFont typeface="Arial"/>
+              <a:buChar char="–"/>
+            </a:pPr>
+            <a:r>
+              <a:rPr lang="fr-FR" sz="2800" b="0" i="0" u="none" strike="noStrike" cap="none" dirty="0">
+                <a:solidFill>
+                  <a:schemeClr val="dk1"/>
+                </a:solidFill>
                 <a:latin typeface="Arial"/>
                 <a:ea typeface="Arial"/>
                 <a:cs typeface="Arial"/>
                 <a:sym typeface="Arial"/>
               </a:rPr>
-              <a:t>d</a:t>
-            </a:r>
-            <a:endParaRPr/>
-          </a:p>
-          <a:p>
-            <a:pPr marL="453599" marR="0" lvl="1" indent="-288499" algn="l" rtl="0">
-              <a:spcBef>
-                <a:spcPts val="560"/>
-              </a:spcBef>
-              <a:spcAft>
-                <a:spcPts val="0"/>
-              </a:spcAft>
-              <a:buClr>
-                <a:schemeClr val="accent1"/>
-              </a:buClr>
-              <a:buSzPts val="2800"/>
-              <a:buFont typeface="Arial"/>
-              <a:buChar char="–"/>
-            </a:pPr>
-            <a:r>
-              <a:rPr lang="fr-FR" sz="2800" b="0" i="0" u="none" strike="noStrike" cap="none">
+              <a:t>git </a:t>
+            </a:r>
+            <a:r>
+              <a:rPr lang="fr-FR" sz="2800" b="0" i="0" u="none" strike="noStrike" cap="none" dirty="0" err="1">
                 <a:solidFill>
                   <a:schemeClr val="dk1"/>
                 </a:solidFill>
@@ -29659,18 +30412,86 @@
                 <a:cs typeface="Arial"/>
                 <a:sym typeface="Arial"/>
               </a:rPr>
-              <a:t>git commit -m </a:t>
-            </a:r>
-            <a:r>
-              <a:rPr lang="fr-FR">
+              <a:t>add</a:t>
+            </a:r>
+            <a:r>
+              <a:rPr lang="fr-FR" sz="2800" b="0" i="0" u="none" strike="noStrike" cap="none" dirty="0">
+                <a:solidFill>
+                  <a:schemeClr val="dk1"/>
+                </a:solidFill>
                 <a:latin typeface="Arial"/>
                 <a:ea typeface="Arial"/>
                 <a:cs typeface="Arial"/>
                 <a:sym typeface="Arial"/>
               </a:rPr>
-              <a:t>“Adding README.md”</a:t>
-            </a:r>
-            <a:endParaRPr sz="2800" b="0" i="0" u="none" strike="noStrike" cap="none">
+              <a:t> README.m</a:t>
+            </a:r>
+            <a:r>
+              <a:rPr lang="fr-FR" dirty="0">
+                <a:latin typeface="Arial"/>
+                <a:ea typeface="Arial"/>
+                <a:cs typeface="Arial"/>
+                <a:sym typeface="Arial"/>
+              </a:rPr>
+              <a:t>d</a:t>
+            </a:r>
+            <a:endParaRPr dirty="0"/>
+          </a:p>
+          <a:p>
+            <a:pPr marL="453599" marR="0" lvl="1" indent="-288499" algn="l" rtl="0">
+              <a:spcBef>
+                <a:spcPts val="560"/>
+              </a:spcBef>
+              <a:spcAft>
+                <a:spcPts val="0"/>
+              </a:spcAft>
+              <a:buClr>
+                <a:schemeClr val="accent1"/>
+              </a:buClr>
+              <a:buSzPts val="2800"/>
+              <a:buFont typeface="Arial"/>
+              <a:buChar char="–"/>
+            </a:pPr>
+            <a:r>
+              <a:rPr lang="fr-FR" sz="2800" b="0" i="0" u="none" strike="noStrike" cap="none" dirty="0">
+                <a:solidFill>
+                  <a:schemeClr val="dk1"/>
+                </a:solidFill>
+                <a:latin typeface="Arial"/>
+                <a:ea typeface="Arial"/>
+                <a:cs typeface="Arial"/>
+                <a:sym typeface="Arial"/>
+              </a:rPr>
+              <a:t>git commit -m </a:t>
+            </a:r>
+            <a:r>
+              <a:rPr lang="fr-FR" dirty="0">
+                <a:latin typeface="Arial"/>
+                <a:ea typeface="Arial"/>
+                <a:cs typeface="Arial"/>
+                <a:sym typeface="Arial"/>
+              </a:rPr>
+              <a:t>“</a:t>
+            </a:r>
+            <a:r>
+              <a:rPr lang="fr-FR" dirty="0" err="1">
+                <a:latin typeface="Arial"/>
+                <a:ea typeface="Arial"/>
+                <a:cs typeface="Arial"/>
+                <a:sym typeface="Arial"/>
+              </a:rPr>
+              <a:t>Adding</a:t>
+            </a:r>
+            <a:r>
+              <a:rPr lang="fr-FR" dirty="0">
+                <a:latin typeface="Arial"/>
+                <a:ea typeface="Arial"/>
+                <a:cs typeface="Arial"/>
+                <a:sym typeface="Arial"/>
+              </a:rPr>
+              <a:t> README.md”</a:t>
+            </a:r>
+            <a:endParaRPr sz="2800" b="0" i="0" u="none" strike="noStrike" cap="none" dirty="0">
               <a:solidFill>
                 <a:schemeClr val="dk1"/>
               </a:solidFill>
@@ -29696,15 +30517,24 @@
               <a:buChar char="–"/>
             </a:pPr>
             <a:r>
-              <a:rPr lang="fr-FR">
+              <a:rPr lang="fr-FR" dirty="0">
                 <a:latin typeface="Arial"/>
                 <a:ea typeface="Arial"/>
                 <a:cs typeface="Arial"/>
                 <a:sym typeface="Arial"/>
               </a:rPr>
-              <a:t>git status</a:t>
-            </a:r>
-            <a:endParaRPr>
+              <a:t>git </a:t>
+            </a:r>
+            <a:r>
+              <a:rPr lang="fr-FR" dirty="0" err="1">
+                <a:latin typeface="Arial"/>
+                <a:ea typeface="Arial"/>
+                <a:cs typeface="Arial"/>
+                <a:sym typeface="Arial"/>
+              </a:rPr>
+              <a:t>status</a:t>
+            </a:r>
+            <a:endParaRPr dirty="0">
               <a:latin typeface="Arial"/>
               <a:ea typeface="Arial"/>
               <a:cs typeface="Arial"/>

</xml_diff>